<commit_message>
Initial commit for PDF Processor project
</commit_message>
<xml_diff>
--- a/outputs/creative_pdf_presentation.pptx
+++ b/outputs/creative_pdf_presentation.pptx
@@ -3157,7 +3157,7 @@
     <p:bg>
       <p:bgPr>
         <a:solidFill>
-          <a:srgbClr val="E0F2F1"/>
+          <a:srgbClr val="F8BBD0"/>
         </a:solidFill>
         <a:effectLst/>
       </p:bgPr>
@@ -3251,7 +3251,7 @@
     <p:bg>
       <p:bgPr>
         <a:solidFill>
-          <a:srgbClr val="F8BBD0"/>
+          <a:srgbClr val="E8F5E9"/>
         </a:solidFill>
         <a:effectLst/>
       </p:bgPr>
@@ -3369,7 +3369,7 @@
     <p:bg>
       <p:bgPr>
         <a:solidFill>
-          <a:srgbClr val="E0F2F1"/>
+          <a:srgbClr val="E8F5E9"/>
         </a:solidFill>
         <a:effectLst/>
       </p:bgPr>

</xml_diff>